<commit_message>
bring the download link at header
</commit_message>
<xml_diff>
--- a/download/AAD_poster.pptx
+++ b/download/AAD_poster.pptx
@@ -543,14 +543,6 @@
           <a:bodyPr/>
           <a:lstStyle/>
           <a:p>
-            <a:r>
-              <a:rPr lang="en-US" dirty="0" smtClean="0"/>
-              <a:t>- Potentially - Everywhere that says RSS or “Redskin</a:t>
-            </a:r>
-            <a:r>
-              <a:rPr lang="en-US" baseline="0" dirty="0" smtClean="0"/>
-              <a:t> Syndrome” or just TSA or TSW alone, we should change to RSS/TSA/TSW</a:t>
-            </a:r>
             <a:endParaRPr lang="en-US" dirty="0"/>
           </a:p>
         </p:txBody>
@@ -635,44 +627,6 @@
           <a:bodyPr/>
           <a:lstStyle/>
           <a:p>
-            <a:pPr marL="0" marR="0" lvl="3" indent="0" algn="l" defTabSz="914400" rtl="0" eaLnBrk="1" fontAlgn="auto" latinLnBrk="0" hangingPunct="1">
-              <a:lnSpc>
-                <a:spcPct val="100000"/>
-              </a:lnSpc>
-              <a:spcBef>
-                <a:spcPts val="0"/>
-              </a:spcBef>
-              <a:spcAft>
-                <a:spcPts val="0"/>
-              </a:spcAft>
-              <a:buClrTx/>
-              <a:buSzTx/>
-              <a:buFontTx/>
-              <a:buNone/>
-              <a:tabLst/>
-              <a:defRPr/>
-            </a:pPr>
-            <a:r>
-              <a:rPr lang="en-US" dirty="0" smtClean="0"/>
-              <a:t>For age 18</a:t>
-            </a:r>
-            <a:r>
-              <a:rPr lang="en-US" baseline="0" dirty="0" smtClean="0"/>
-              <a:t> - </a:t>
-            </a:r>
-            <a:r>
-              <a:rPr lang="en-US" sz="2400" dirty="0" smtClean="0">
-                <a:solidFill>
-                  <a:schemeClr val="tx1">
-                    <a:lumMod val="85000"/>
-                    <a:lumOff val="15000"/>
-                  </a:schemeClr>
-                </a:solidFill>
-              </a:rPr>
-              <a:t>(or did we use over age 16? verify with Patricia)</a:t>
-            </a:r>
-          </a:p>
-          <a:p>
             <a:endParaRPr lang="en-US" dirty="0"/>
           </a:p>
         </p:txBody>
@@ -757,14 +711,6 @@
           <a:bodyPr/>
           <a:lstStyle/>
           <a:p>
-            <a:r>
-              <a:rPr lang="en-US" dirty="0" smtClean="0"/>
-              <a:t>- Change</a:t>
-            </a:r>
-            <a:r>
-              <a:rPr lang="en-US" baseline="0" dirty="0" smtClean="0"/>
-              <a:t> label name </a:t>
-            </a:r>
             <a:endParaRPr lang="en-US" dirty="0"/>
           </a:p>
         </p:txBody>
@@ -1660,11 +1606,7 @@
             </a:r>
             <a:r>
               <a:rPr lang="en-US" sz="1600" dirty="0" smtClean="0"/>
-              <a:t>, Tanzir </a:t>
-            </a:r>
-            <a:r>
-              <a:rPr lang="en-US" sz="1600" dirty="0" smtClean="0"/>
-              <a:t>Hasan MPH</a:t>
+              <a:t>, Tanzir Hasan MPH</a:t>
             </a:r>
             <a:endParaRPr lang="en-US" sz="1600" dirty="0"/>
           </a:p>
@@ -1951,8 +1893,8 @@
         </p:nvSpPr>
         <p:spPr>
           <a:xfrm>
-            <a:off x="-304800" y="304800"/>
-            <a:ext cx="9677400" cy="1031051"/>
+            <a:off x="-114300" y="0"/>
+            <a:ext cx="9372600" cy="1400383"/>
           </a:xfrm>
           <a:prstGeom prst="rect">
             <a:avLst/>
@@ -1970,7 +1912,19 @@
               <a:rPr lang="en-US" altLang="ja-JP" sz="2400" dirty="0">
                 <a:latin typeface="+mj-lt"/>
               </a:rPr>
-              <a:t>The younger the age of starting TCS, the greater the skin affected </a:t>
+              <a:t>The younger the age of starting TCS, the greater </a:t>
+            </a:r>
+            <a:r>
+              <a:rPr lang="en-US" altLang="ja-JP" sz="2400" dirty="0" smtClean="0">
+                <a:latin typeface="+mj-lt"/>
+              </a:rPr>
+              <a:t>the % </a:t>
+            </a:r>
+            <a:r>
+              <a:rPr lang="en-US" altLang="ja-JP" sz="2400" dirty="0">
+                <a:latin typeface="+mj-lt"/>
+              </a:rPr>
+              <a:t>skin affected </a:t>
             </a:r>
             <a:endParaRPr lang="en-US" altLang="ja-JP" sz="2400" dirty="0" smtClean="0">
               <a:latin typeface="+mj-lt"/>

</xml_diff>